<commit_message>
Added Build After Party 2024
</commit_message>
<xml_diff>
--- a/Wellington-Code-Camp-2024/Turing.pptx
+++ b/Wellington-Code-Camp-2024/Turing.pptx
@@ -345,7 +345,7 @@
             <a:fld id="{B61BEF0D-F0BB-DE4B-95CE-6DB70DBA9567}" type="datetimeFigureOut">
               <a:rPr lang="en-US" dirty="0"/>
               <a:pPr/>
-              <a:t>4/10/2024</a:t>
+              <a:t>4/11/2024</a:t>
             </a:fld>
             <a:endParaRPr lang="en-US" dirty="0"/>
           </a:p>
@@ -680,7 +680,7 @@
             <a:fld id="{B61BEF0D-F0BB-DE4B-95CE-6DB70DBA9567}" type="datetimeFigureOut">
               <a:rPr lang="en-US" dirty="0"/>
               <a:pPr/>
-              <a:t>4/10/2024</a:t>
+              <a:t>4/11/2024</a:t>
             </a:fld>
             <a:endParaRPr lang="en-US" dirty="0"/>
           </a:p>
@@ -1078,7 +1078,7 @@
             <a:fld id="{B61BEF0D-F0BB-DE4B-95CE-6DB70DBA9567}" type="datetimeFigureOut">
               <a:rPr lang="en-US" dirty="0"/>
               <a:pPr/>
-              <a:t>4/10/2024</a:t>
+              <a:t>4/11/2024</a:t>
             </a:fld>
             <a:endParaRPr lang="en-US" dirty="0"/>
           </a:p>
@@ -1411,7 +1411,7 @@
             <a:fld id="{B61BEF0D-F0BB-DE4B-95CE-6DB70DBA9567}" type="datetimeFigureOut">
               <a:rPr lang="en-US" dirty="0"/>
               <a:pPr/>
-              <a:t>4/10/2024</a:t>
+              <a:t>4/11/2024</a:t>
             </a:fld>
             <a:endParaRPr lang="en-US" dirty="0"/>
           </a:p>
@@ -1728,7 +1728,7 @@
             <a:fld id="{B61BEF0D-F0BB-DE4B-95CE-6DB70DBA9567}" type="datetimeFigureOut">
               <a:rPr lang="en-US" dirty="0"/>
               <a:pPr/>
-              <a:t>4/10/2024</a:t>
+              <a:t>4/11/2024</a:t>
             </a:fld>
             <a:endParaRPr lang="en-US" dirty="0"/>
           </a:p>
@@ -2121,7 +2121,7 @@
             <a:fld id="{B61BEF0D-F0BB-DE4B-95CE-6DB70DBA9567}" type="datetimeFigureOut">
               <a:rPr lang="en-US" dirty="0"/>
               <a:pPr/>
-              <a:t>4/10/2024</a:t>
+              <a:t>4/11/2024</a:t>
             </a:fld>
             <a:endParaRPr lang="en-US" dirty="0"/>
           </a:p>
@@ -2375,7 +2375,7 @@
             <a:fld id="{B61BEF0D-F0BB-DE4B-95CE-6DB70DBA9567}" type="datetimeFigureOut">
               <a:rPr lang="en-US" dirty="0"/>
               <a:pPr/>
-              <a:t>4/10/2024</a:t>
+              <a:t>4/11/2024</a:t>
             </a:fld>
             <a:endParaRPr lang="en-US" dirty="0"/>
           </a:p>
@@ -2634,7 +2634,7 @@
             <a:fld id="{B61BEF0D-F0BB-DE4B-95CE-6DB70DBA9567}" type="datetimeFigureOut">
               <a:rPr lang="en-US" dirty="0"/>
               <a:pPr/>
-              <a:t>4/10/2024</a:t>
+              <a:t>4/11/2024</a:t>
             </a:fld>
             <a:endParaRPr lang="en-US" dirty="0"/>
           </a:p>
@@ -2893,7 +2893,7 @@
             <a:fld id="{B61BEF0D-F0BB-DE4B-95CE-6DB70DBA9567}" type="datetimeFigureOut">
               <a:rPr lang="en-US" dirty="0"/>
               <a:pPr/>
-              <a:t>4/10/2024</a:t>
+              <a:t>4/11/2024</a:t>
             </a:fld>
             <a:endParaRPr lang="en-US" dirty="0"/>
           </a:p>
@@ -3219,7 +3219,7 @@
             <a:fld id="{B61BEF0D-F0BB-DE4B-95CE-6DB70DBA9567}" type="datetimeFigureOut">
               <a:rPr lang="en-US" dirty="0"/>
               <a:pPr/>
-              <a:t>4/10/2024</a:t>
+              <a:t>4/11/2024</a:t>
             </a:fld>
             <a:endParaRPr lang="en-US" dirty="0"/>
           </a:p>
@@ -3539,7 +3539,7 @@
             <a:fld id="{B61BEF0D-F0BB-DE4B-95CE-6DB70DBA9567}" type="datetimeFigureOut">
               <a:rPr lang="en-US" dirty="0"/>
               <a:pPr/>
-              <a:t>4/10/2024</a:t>
+              <a:t>4/11/2024</a:t>
             </a:fld>
             <a:endParaRPr lang="en-US" dirty="0"/>
           </a:p>
@@ -3993,7 +3993,7 @@
             <a:fld id="{B61BEF0D-F0BB-DE4B-95CE-6DB70DBA9567}" type="datetimeFigureOut">
               <a:rPr lang="en-US" dirty="0"/>
               <a:pPr/>
-              <a:t>4/10/2024</a:t>
+              <a:t>4/11/2024</a:t>
             </a:fld>
             <a:endParaRPr lang="en-US" dirty="0"/>
           </a:p>
@@ -4195,7 +4195,7 @@
             <a:fld id="{B61BEF0D-F0BB-DE4B-95CE-6DB70DBA9567}" type="datetimeFigureOut">
               <a:rPr lang="en-US" dirty="0"/>
               <a:pPr/>
-              <a:t>4/10/2024</a:t>
+              <a:t>4/11/2024</a:t>
             </a:fld>
             <a:endParaRPr lang="en-US" dirty="0"/>
           </a:p>
@@ -4369,7 +4369,7 @@
             <a:fld id="{B61BEF0D-F0BB-DE4B-95CE-6DB70DBA9567}" type="datetimeFigureOut">
               <a:rPr lang="en-US" dirty="0"/>
               <a:pPr/>
-              <a:t>4/10/2024</a:t>
+              <a:t>4/11/2024</a:t>
             </a:fld>
             <a:endParaRPr lang="en-US" dirty="0"/>
           </a:p>
@@ -4699,7 +4699,7 @@
             <a:fld id="{B61BEF0D-F0BB-DE4B-95CE-6DB70DBA9567}" type="datetimeFigureOut">
               <a:rPr lang="en-US" dirty="0"/>
               <a:pPr/>
-              <a:t>4/10/2024</a:t>
+              <a:t>4/11/2024</a:t>
             </a:fld>
             <a:endParaRPr lang="en-US" dirty="0"/>
           </a:p>
@@ -5040,7 +5040,7 @@
             <a:fld id="{B61BEF0D-F0BB-DE4B-95CE-6DB70DBA9567}" type="datetimeFigureOut">
               <a:rPr lang="en-US" dirty="0"/>
               <a:pPr/>
-              <a:t>4/10/2024</a:t>
+              <a:t>4/11/2024</a:t>
             </a:fld>
             <a:endParaRPr lang="en-US" dirty="0"/>
           </a:p>
@@ -7154,7 +7154,7 @@
             <a:fld id="{B61BEF0D-F0BB-DE4B-95CE-6DB70DBA9567}" type="datetimeFigureOut">
               <a:rPr lang="en-US" dirty="0"/>
               <a:pPr/>
-              <a:t>4/10/2024</a:t>
+              <a:t>4/11/2024</a:t>
             </a:fld>
             <a:endParaRPr lang="en-US" dirty="0"/>
           </a:p>
@@ -13862,10 +13862,10 @@
             <a:blip r:embed="rId2">
               <a:extLst>
                 <a:ext uri="">
-                  <a14:useLocalDpi xmlns:wpc="http://schemas.microsoft.com/office/word/2010/wordprocessingCanvas" xmlns:cx="http://schemas.microsoft.com/office/drawing/2014/chartex" xmlns:cx1="http://schemas.microsoft.com/office/drawing/2015/9/8/chartex" xmlns:cx2="http://schemas.microsoft.com/office/drawing/2015/10/21/chartex" xmlns:cx3="http://schemas.microsoft.com/office/drawing/2016/5/9/chartex" xmlns:cx4="http://schemas.microsoft.com/office/drawing/2016/5/10/chartex" xmlns:cx5="http://schemas.microsoft.com/office/drawing/2016/5/11/chartex" xmlns:cx6="http://schemas.microsoft.com/office/drawing/2016/5/12/chartex" xmlns:cx7="http://schemas.microsoft.com/office/drawing/2016/5/13/chartex" xmlns:cx8="http://schemas.microsoft.com/office/drawing/2016/5/14/chartex" xmlns:mc="http://schemas.openxmlformats.org/markup-compatibility/2006" xmlns:aink="http://schemas.microsoft.com/office/drawing/2016/ink" xmlns:am3d="http://schemas.microsoft.com/office/drawing/2017/model3d" xmlns:oel="http://schemas.microsoft.com/office/2019/extlst" xmlns:m="http://schemas.openxmlformats.org/officeDocument/2006/math" xmlns:wp14="http://schemas.microsoft.com/office/word/2010/wordprocessingDrawing" xmlns:wp="http://schemas.openxmlformats.org/drawingml/2006/wordprocessingDrawing" xmlns:w14="http://schemas.microsoft.com/office/word/2010/wordml" xmlns:w15="http://schemas.microsoft.com/office/word/2012/wordml" xmlns:w16cex="http://schemas.microsoft.com/office/word/2018/wordml/cex" xmlns:w16cid="http://schemas.microsoft.com/office/word/2016/wordml/cid" xmlns:w16="http://schemas.microsoft.com/office/word/2018/wordml" xmlns:w16du="http://schemas.microsoft.com/office/word/2023/wordml/word16du" xmlns:w16sdtdh="http://schemas.microsoft.com/office/word/2020/wordml/sdtdatahash" xmlns:w16se="http://schemas.microsoft.com/office/word/2015/wordml/symex" xmlns:wpg="http://schemas.microsoft.com/office/word/2010/wordprocessingGroup" xmlns:wpi="http://schemas.microsoft.com/office/word/2010/wordprocessingInk" xmlns:wne="http://schemas.microsoft.com/office/word/2006/wordml" xmlns:wps="http://schemas.microsoft.com/office/word/2010/wordprocessingShape" xmlns:pic="http://schemas.openxmlformats.org/drawingml/2006/picture" xmlns:o="urn:schemas-microsoft-com:office:office" xmlns:v="urn:schemas-microsoft-com:vml" xmlns:w10="urn:schemas-microsoft-com:office:word" xmlns:a14="http://schemas.microsoft.com/office/drawing/2010/main" xmlns:w="http://schemas.openxmlformats.org/wordprocessingml/2006/main" xmlns="" xmlns:lc="http://schemas.openxmlformats.org/drawingml/2006/lockedCanvas" val="0"/>
+                  <a14:useLocalDpi xmlns:lc="http://schemas.openxmlformats.org/drawingml/2006/lockedCanvas" xmlns="" xmlns:w="http://schemas.openxmlformats.org/wordprocessingml/2006/main" xmlns:a14="http://schemas.microsoft.com/office/drawing/2010/main" xmlns:w10="urn:schemas-microsoft-com:office:word" xmlns:v="urn:schemas-microsoft-com:vml" xmlns:o="urn:schemas-microsoft-com:office:office" xmlns:pic="http://schemas.openxmlformats.org/drawingml/2006/picture" xmlns:wps="http://schemas.microsoft.com/office/word/2010/wordprocessingShape" xmlns:wne="http://schemas.microsoft.com/office/word/2006/wordml" xmlns:wpi="http://schemas.microsoft.com/office/word/2010/wordprocessingInk" xmlns:wpg="http://schemas.microsoft.com/office/word/2010/wordprocessingGroup" xmlns:w16se="http://schemas.microsoft.com/office/word/2015/wordml/symex" xmlns:w16sdtdh="http://schemas.microsoft.com/office/word/2020/wordml/sdtdatahash" xmlns:w16du="http://schemas.microsoft.com/office/word/2023/wordml/word16du" xmlns:w16="http://schemas.microsoft.com/office/word/2018/wordml" xmlns:w16cid="http://schemas.microsoft.com/office/word/2016/wordml/cid" xmlns:w16cex="http://schemas.microsoft.com/office/word/2018/wordml/cex" xmlns:w15="http://schemas.microsoft.com/office/word/2012/wordml" xmlns:w14="http://schemas.microsoft.com/office/word/2010/wordml" xmlns:wp="http://schemas.openxmlformats.org/drawingml/2006/wordprocessingDrawing" xmlns:wp14="http://schemas.microsoft.com/office/word/2010/wordprocessingDrawing" xmlns:m="http://schemas.openxmlformats.org/officeDocument/2006/math" xmlns:oel="http://schemas.microsoft.com/office/2019/extlst" xmlns:am3d="http://schemas.microsoft.com/office/drawing/2017/model3d" xmlns:aink="http://schemas.microsoft.com/office/drawing/2016/ink" xmlns:mc="http://schemas.openxmlformats.org/markup-compatibility/2006" xmlns:cx8="http://schemas.microsoft.com/office/drawing/2016/5/14/chartex" xmlns:cx7="http://schemas.microsoft.com/office/drawing/2016/5/13/chartex" xmlns:cx6="http://schemas.microsoft.com/office/drawing/2016/5/12/chartex" xmlns:cx5="http://schemas.microsoft.com/office/drawing/2016/5/11/chartex" xmlns:cx4="http://schemas.microsoft.com/office/drawing/2016/5/10/chartex" xmlns:cx3="http://schemas.microsoft.com/office/drawing/2016/5/9/chartex" xmlns:cx2="http://schemas.microsoft.com/office/drawing/2015/10/21/chartex" xmlns:cx1="http://schemas.microsoft.com/office/drawing/2015/9/8/chartex" xmlns:cx="http://schemas.microsoft.com/office/drawing/2014/chartex" xmlns:wpc="http://schemas.microsoft.com/office/word/2010/wordprocessingCanvas" val="0"/>
                 </a:ext>
                 <a:ext uri="">
-                  <a1611:picAttrSrcUrl xmlns:wpc="http://schemas.microsoft.com/office/word/2010/wordprocessingCanvas" xmlns:cx="http://schemas.microsoft.com/office/drawing/2014/chartex" xmlns:cx1="http://schemas.microsoft.com/office/drawing/2015/9/8/chartex" xmlns:cx2="http://schemas.microsoft.com/office/drawing/2015/10/21/chartex" xmlns:cx3="http://schemas.microsoft.com/office/drawing/2016/5/9/chartex" xmlns:cx4="http://schemas.microsoft.com/office/drawing/2016/5/10/chartex" xmlns:cx5="http://schemas.microsoft.com/office/drawing/2016/5/11/chartex" xmlns:cx6="http://schemas.microsoft.com/office/drawing/2016/5/12/chartex" xmlns:cx7="http://schemas.microsoft.com/office/drawing/2016/5/13/chartex" xmlns:cx8="http://schemas.microsoft.com/office/drawing/2016/5/14/chartex" xmlns:mc="http://schemas.openxmlformats.org/markup-compatibility/2006" xmlns:aink="http://schemas.microsoft.com/office/drawing/2016/ink" xmlns:am3d="http://schemas.microsoft.com/office/drawing/2017/model3d" xmlns:oel="http://schemas.microsoft.com/office/2019/extlst" xmlns:m="http://schemas.openxmlformats.org/officeDocument/2006/math" xmlns:wp14="http://schemas.microsoft.com/office/word/2010/wordprocessingDrawing" xmlns:wp="http://schemas.openxmlformats.org/drawingml/2006/wordprocessingDrawing" xmlns:w14="http://schemas.microsoft.com/office/word/2010/wordml" xmlns:w15="http://schemas.microsoft.com/office/word/2012/wordml" xmlns:w16cex="http://schemas.microsoft.com/office/word/2018/wordml/cex" xmlns:w16cid="http://schemas.microsoft.com/office/word/2016/wordml/cid" xmlns:w16="http://schemas.microsoft.com/office/word/2018/wordml" xmlns:w16du="http://schemas.microsoft.com/office/word/2023/wordml/word16du" xmlns:w16sdtdh="http://schemas.microsoft.com/office/word/2020/wordml/sdtdatahash" xmlns:w16se="http://schemas.microsoft.com/office/word/2015/wordml/symex" xmlns:wpg="http://schemas.microsoft.com/office/word/2010/wordprocessingGroup" xmlns:wpi="http://schemas.microsoft.com/office/word/2010/wordprocessingInk" xmlns:wne="http://schemas.microsoft.com/office/word/2006/wordml" xmlns:wps="http://schemas.microsoft.com/office/word/2010/wordprocessingShape" xmlns:pic="http://schemas.openxmlformats.org/drawingml/2006/picture" xmlns:o="urn:schemas-microsoft-com:office:office" xmlns:v="urn:schemas-microsoft-com:vml" xmlns:w10="urn:schemas-microsoft-com:office:word" xmlns:a1611="http://schemas.microsoft.com/office/drawing/2016/11/main" xmlns:w="http://schemas.openxmlformats.org/wordprocessingml/2006/main" xmlns="" xmlns:lc="http://schemas.openxmlformats.org/drawingml/2006/lockedCanvas" r:id="rId7"/>
+                  <a1611:picAttrSrcUrl xmlns:lc="http://schemas.openxmlformats.org/drawingml/2006/lockedCanvas" xmlns="" xmlns:w="http://schemas.openxmlformats.org/wordprocessingml/2006/main" xmlns:a1611="http://schemas.microsoft.com/office/drawing/2016/11/main" xmlns:w10="urn:schemas-microsoft-com:office:word" xmlns:v="urn:schemas-microsoft-com:vml" xmlns:o="urn:schemas-microsoft-com:office:office" xmlns:pic="http://schemas.openxmlformats.org/drawingml/2006/picture" xmlns:wps="http://schemas.microsoft.com/office/word/2010/wordprocessingShape" xmlns:wne="http://schemas.microsoft.com/office/word/2006/wordml" xmlns:wpi="http://schemas.microsoft.com/office/word/2010/wordprocessingInk" xmlns:wpg="http://schemas.microsoft.com/office/word/2010/wordprocessingGroup" xmlns:w16se="http://schemas.microsoft.com/office/word/2015/wordml/symex" xmlns:w16sdtdh="http://schemas.microsoft.com/office/word/2020/wordml/sdtdatahash" xmlns:w16du="http://schemas.microsoft.com/office/word/2023/wordml/word16du" xmlns:w16="http://schemas.microsoft.com/office/word/2018/wordml" xmlns:w16cid="http://schemas.microsoft.com/office/word/2016/wordml/cid" xmlns:w16cex="http://schemas.microsoft.com/office/word/2018/wordml/cex" xmlns:w15="http://schemas.microsoft.com/office/word/2012/wordml" xmlns:w14="http://schemas.microsoft.com/office/word/2010/wordml" xmlns:wp="http://schemas.openxmlformats.org/drawingml/2006/wordprocessingDrawing" xmlns:wp14="http://schemas.microsoft.com/office/word/2010/wordprocessingDrawing" xmlns:m="http://schemas.openxmlformats.org/officeDocument/2006/math" xmlns:oel="http://schemas.microsoft.com/office/2019/extlst" xmlns:am3d="http://schemas.microsoft.com/office/drawing/2017/model3d" xmlns:aink="http://schemas.microsoft.com/office/drawing/2016/ink" xmlns:mc="http://schemas.openxmlformats.org/markup-compatibility/2006" xmlns:cx8="http://schemas.microsoft.com/office/drawing/2016/5/14/chartex" xmlns:cx7="http://schemas.microsoft.com/office/drawing/2016/5/13/chartex" xmlns:cx6="http://schemas.microsoft.com/office/drawing/2016/5/12/chartex" xmlns:cx5="http://schemas.microsoft.com/office/drawing/2016/5/11/chartex" xmlns:cx4="http://schemas.microsoft.com/office/drawing/2016/5/10/chartex" xmlns:cx3="http://schemas.microsoft.com/office/drawing/2016/5/9/chartex" xmlns:cx2="http://schemas.microsoft.com/office/drawing/2015/10/21/chartex" xmlns:cx1="http://schemas.microsoft.com/office/drawing/2015/9/8/chartex" xmlns:cx="http://schemas.microsoft.com/office/drawing/2014/chartex" xmlns:wpc="http://schemas.microsoft.com/office/word/2010/wordprocessingCanvas" r:id="rId7"/>
                 </a:ext>
               </a:extLst>
             </a:blip>
@@ -19747,7 +19747,7 @@
 </file>
 
 <file path=ppt/slides/slide31.xml><?xml version="1.0" encoding="utf-8"?>
-<p:sld xmlns:a="http://schemas.openxmlformats.org/drawingml/2006/main" xmlns:r="http://schemas.openxmlformats.org/officeDocument/2006/relationships" xmlns:p="http://schemas.openxmlformats.org/presentationml/2006/main">
+<p:sld xmlns:a="http://schemas.openxmlformats.org/drawingml/2006/main" xmlns:r="http://schemas.openxmlformats.org/officeDocument/2006/relationships" xmlns:p="http://schemas.openxmlformats.org/presentationml/2006/main" show="0">
   <p:cSld>
     <p:spTree>
       <p:nvGrpSpPr>
@@ -20113,7 +20113,7 @@
 </file>
 
 <file path=ppt/slides/slide32.xml><?xml version="1.0" encoding="utf-8"?>
-<p:sld xmlns:a="http://schemas.openxmlformats.org/drawingml/2006/main" xmlns:r="http://schemas.openxmlformats.org/officeDocument/2006/relationships" xmlns:p="http://schemas.openxmlformats.org/presentationml/2006/main">
+<p:sld xmlns:a="http://schemas.openxmlformats.org/drawingml/2006/main" xmlns:r="http://schemas.openxmlformats.org/officeDocument/2006/relationships" xmlns:p="http://schemas.openxmlformats.org/presentationml/2006/main" show="0">
   <p:cSld>
     <p:spTree>
       <p:nvGrpSpPr>
@@ -20903,7 +20903,7 @@
                 <a:latin typeface="Arial" panose="020B0604020202020204" pitchFamily="34" charset="0"/>
                 <a:cs typeface="Arial" panose="020B0604020202020204" pitchFamily="34" charset="0"/>
               </a:rPr>
-              <a:t>The halting problem (2)</a:t>
+              <a:t>The halting problem (1)</a:t>
             </a:r>
             <a:endParaRPr lang="en-NZ" sz="4000" dirty="0">
               <a:latin typeface="Arial" panose="020B0604020202020204" pitchFamily="34" charset="0"/>
@@ -21216,7 +21216,7 @@
                 <a:latin typeface="Arial" panose="020B0604020202020204" pitchFamily="34" charset="0"/>
                 <a:cs typeface="Arial" panose="020B0604020202020204" pitchFamily="34" charset="0"/>
               </a:rPr>
-              <a:t>The halting problem (3)</a:t>
+              <a:t>The halting problem (2)</a:t>
             </a:r>
             <a:endParaRPr lang="en-NZ" sz="4000" dirty="0">
               <a:latin typeface="Arial" panose="020B0604020202020204" pitchFamily="34" charset="0"/>

</xml_diff>